<commit_message>
Add data rights legend to tech talk slides
</commit_message>
<xml_diff>
--- a/download/Inferno_Tech_Talk_Dec_13_2023.pptx
+++ b/download/Inferno_Tech_Talk_Dec_13_2023.pptx
@@ -7,10 +7,10 @@
     <p:sldMasterId id="2147483823" r:id="rId6"/>
   </p:sldMasterIdLst>
   <p:notesMasterIdLst>
-    <p:notesMasterId r:id="rId26"/>
+    <p:notesMasterId r:id="rId27"/>
   </p:notesMasterIdLst>
   <p:handoutMasterIdLst>
-    <p:handoutMasterId r:id="rId27"/>
+    <p:handoutMasterId r:id="rId28"/>
   </p:handoutMasterIdLst>
   <p:sldIdLst>
     <p:sldId id="367" r:id="rId7"/>
@@ -32,6 +32,7 @@
     <p:sldId id="579" r:id="rId23"/>
     <p:sldId id="402" r:id="rId24"/>
     <p:sldId id="410" r:id="rId25"/>
+    <p:sldId id="623" r:id="rId26"/>
   </p:sldIdLst>
   <p:sldSz cx="12192000" cy="6858000"/>
   <p:notesSz cx="7026275" cy="9312275"/>
@@ -154,6 +155,7 @@
             <p14:sldId id="579"/>
             <p14:sldId id="402"/>
             <p14:sldId id="410"/>
+            <p14:sldId id="623"/>
           </p14:sldIdLst>
         </p14:section>
       </p14:sectionLst>
@@ -3999,7 +4001,7 @@
           <a:p>
             <a:fld id="{B4318C28-50FE-4D62-AB0A-E3BC1C655C14}" type="datetimeFigureOut">
               <a:rPr lang="en-US" smtClean="0"/>
-              <a:t>12/13/2023</a:t>
+              <a:t>12/28/23</a:t>
             </a:fld>
             <a:endParaRPr lang="en-US"/>
           </a:p>
@@ -4176,7 +4178,7 @@
           <a:p>
             <a:fld id="{EC3C951D-F095-0545-ACFB-1197D733EACA}" type="datetimeFigureOut">
               <a:rPr lang="en-US" smtClean="0"/>
-              <a:t>12/13/2023</a:t>
+              <a:t>12/28/23</a:t>
             </a:fld>
             <a:endParaRPr lang="en-US"/>
           </a:p>
@@ -4518,6 +4520,90 @@
     <p:extLst>
       <p:ext uri="{BB962C8B-B14F-4D97-AF65-F5344CB8AC3E}">
         <p14:creationId xmlns:p14="http://schemas.microsoft.com/office/powerpoint/2010/main" val="3111502254"/>
+      </p:ext>
+    </p:extLst>
+  </p:cSld>
+  <p:clrMapOvr>
+    <a:masterClrMapping/>
+  </p:clrMapOvr>
+</p:notes>
+</file>
+
+<file path=ppt/notesSlides/notesSlide2.xml><?xml version="1.0" encoding="utf-8"?>
+<p:notes xmlns:a="http://schemas.openxmlformats.org/drawingml/2006/main" xmlns:r="http://schemas.openxmlformats.org/officeDocument/2006/relationships" xmlns:p="http://schemas.openxmlformats.org/presentationml/2006/main">
+  <p:cSld>
+    <p:spTree>
+      <p:nvGrpSpPr>
+        <p:cNvPr id="1" name=""/>
+        <p:cNvGrpSpPr/>
+        <p:nvPr/>
+      </p:nvGrpSpPr>
+      <p:grpSpPr>
+        <a:xfrm>
+          <a:off x="0" y="0"/>
+          <a:ext cx="0" cy="0"/>
+          <a:chOff x="0" y="0"/>
+          <a:chExt cx="0" cy="0"/>
+        </a:xfrm>
+      </p:grpSpPr>
+      <p:sp>
+        <p:nvSpPr>
+          <p:cNvPr id="2" name="Slide Image Placeholder 1"/>
+          <p:cNvSpPr>
+            <a:spLocks noGrp="1" noRot="1" noChangeAspect="1"/>
+          </p:cNvSpPr>
+          <p:nvPr>
+            <p:ph type="sldImg"/>
+          </p:nvPr>
+        </p:nvSpPr>
+        <p:spPr/>
+      </p:sp>
+      <p:sp>
+        <p:nvSpPr>
+          <p:cNvPr id="3" name="Notes Placeholder 2"/>
+          <p:cNvSpPr>
+            <a:spLocks noGrp="1"/>
+          </p:cNvSpPr>
+          <p:nvPr>
+            <p:ph type="body" idx="1"/>
+          </p:nvPr>
+        </p:nvSpPr>
+        <p:spPr/>
+        <p:txBody>
+          <a:bodyPr/>
+          <a:lstStyle/>
+          <a:p>
+            <a:endParaRPr lang="en-US" dirty="0"/>
+          </a:p>
+        </p:txBody>
+      </p:sp>
+      <p:sp>
+        <p:nvSpPr>
+          <p:cNvPr id="4" name="Slide Number Placeholder 3"/>
+          <p:cNvSpPr>
+            <a:spLocks noGrp="1"/>
+          </p:cNvSpPr>
+          <p:nvPr>
+            <p:ph type="sldNum" sz="quarter" idx="5"/>
+          </p:nvPr>
+        </p:nvSpPr>
+        <p:spPr/>
+        <p:txBody>
+          <a:bodyPr/>
+          <a:lstStyle/>
+          <a:p>
+            <a:fld id="{363DA6FE-9131-A440-8654-6B8559CB7F0A}" type="slidenum">
+              <a:rPr lang="en-US" smtClean="0"/>
+              <a:t>20</a:t>
+            </a:fld>
+            <a:endParaRPr lang="en-US"/>
+          </a:p>
+        </p:txBody>
+      </p:sp>
+    </p:spTree>
+    <p:extLst>
+      <p:ext uri="{BB962C8B-B14F-4D97-AF65-F5344CB8AC3E}">
+        <p14:creationId xmlns:p14="http://schemas.microsoft.com/office/powerpoint/2010/main" val="392257480"/>
       </p:ext>
     </p:extLst>
   </p:cSld>
@@ -30254,6 +30340,351 @@
     <p:extLst>
       <p:ext uri="{BB962C8B-B14F-4D97-AF65-F5344CB8AC3E}">
         <p14:creationId xmlns:p14="http://schemas.microsoft.com/office/powerpoint/2010/main" val="1404918291"/>
+      </p:ext>
+    </p:extLst>
+  </p:cSld>
+  <p:clrMapOvr>
+    <a:masterClrMapping/>
+  </p:clrMapOvr>
+</p:sld>
+</file>
+
+<file path=ppt/slides/slide20.xml><?xml version="1.0" encoding="utf-8"?>
+<p:sld xmlns:a="http://schemas.openxmlformats.org/drawingml/2006/main" xmlns:r="http://schemas.openxmlformats.org/officeDocument/2006/relationships" xmlns:p="http://schemas.openxmlformats.org/presentationml/2006/main">
+  <p:cSld>
+    <p:spTree>
+      <p:nvGrpSpPr>
+        <p:cNvPr id="1" name=""/>
+        <p:cNvGrpSpPr/>
+        <p:nvPr/>
+      </p:nvGrpSpPr>
+      <p:grpSpPr>
+        <a:xfrm>
+          <a:off x="0" y="0"/>
+          <a:ext cx="0" cy="0"/>
+          <a:chOff x="0" y="0"/>
+          <a:chExt cx="0" cy="0"/>
+        </a:xfrm>
+      </p:grpSpPr>
+      <p:sp>
+        <p:nvSpPr>
+          <p:cNvPr id="2" name="Slide Number Placeholder 1">
+            <a:extLst>
+              <a:ext uri="{FF2B5EF4-FFF2-40B4-BE49-F238E27FC236}">
+                <a16:creationId xmlns:a16="http://schemas.microsoft.com/office/drawing/2014/main" id="{403CAC34-752E-04CD-0B63-4F046A16E0C0}"/>
+              </a:ext>
+            </a:extLst>
+          </p:cNvPr>
+          <p:cNvSpPr>
+            <a:spLocks noGrp="1"/>
+          </p:cNvSpPr>
+          <p:nvPr>
+            <p:ph type="sldNum" sz="quarter" idx="11"/>
+          </p:nvPr>
+        </p:nvSpPr>
+        <p:spPr/>
+        <p:txBody>
+          <a:bodyPr/>
+          <a:lstStyle/>
+          <a:p>
+            <a:fld id="{2F2F552B-1952-B44E-8CAB-5705F0ACD2E2}" type="slidenum">
+              <a:rPr lang="uk-UA" smtClean="0"/>
+              <a:pPr/>
+              <a:t>20</a:t>
+            </a:fld>
+            <a:endParaRPr lang="uk-UA"/>
+          </a:p>
+        </p:txBody>
+      </p:sp>
+      <p:sp>
+        <p:nvSpPr>
+          <p:cNvPr id="4" name="Content Placeholder 3">
+            <a:extLst>
+              <a:ext uri="{FF2B5EF4-FFF2-40B4-BE49-F238E27FC236}">
+                <a16:creationId xmlns:a16="http://schemas.microsoft.com/office/drawing/2014/main" id="{5035CA03-E426-FB7B-E001-B7518043C71D}"/>
+              </a:ext>
+            </a:extLst>
+          </p:cNvPr>
+          <p:cNvSpPr>
+            <a:spLocks noGrp="1"/>
+          </p:cNvSpPr>
+          <p:nvPr>
+            <p:ph sz="quarter" idx="12"/>
+          </p:nvPr>
+        </p:nvSpPr>
+        <p:spPr>
+          <a:xfrm>
+            <a:off x="457200" y="256559"/>
+            <a:ext cx="11277600" cy="6004756"/>
+          </a:xfrm>
+        </p:spPr>
+        <p:txBody>
+          <a:bodyPr anchor="ctr"/>
+          <a:lstStyle/>
+          <a:p>
+            <a:pPr marL="231775" marR="0" indent="0" algn="ctr">
+              <a:spcBef>
+                <a:spcPts val="0"/>
+              </a:spcBef>
+              <a:spcAft>
+                <a:spcPts val="0"/>
+              </a:spcAft>
+              <a:buNone/>
+            </a:pPr>
+            <a:r>
+              <a:rPr lang="en-US" sz="1800" b="1" dirty="0">
+                <a:effectLst/>
+                <a:latin typeface="Times"/>
+                <a:ea typeface="Times New Roman" panose="02020603050405020304" pitchFamily="18" charset="0"/>
+                <a:cs typeface="Times New Roman" panose="02020603050405020304" pitchFamily="18" charset="0"/>
+              </a:rPr>
+              <a:t>NOTICE</a:t>
+            </a:r>
+            <a:endParaRPr lang="en-US" sz="1800" dirty="0">
+              <a:effectLst/>
+              <a:latin typeface="Times New Roman" panose="02020603050405020304" pitchFamily="18" charset="0"/>
+              <a:ea typeface="Times New Roman" panose="02020603050405020304" pitchFamily="18" charset="0"/>
+            </a:endParaRPr>
+          </a:p>
+          <a:p>
+            <a:pPr marL="231775" marR="0" indent="0" algn="ctr">
+              <a:spcBef>
+                <a:spcPts val="0"/>
+              </a:spcBef>
+              <a:spcAft>
+                <a:spcPts val="0"/>
+              </a:spcAft>
+              <a:buNone/>
+            </a:pPr>
+            <a:r>
+              <a:rPr lang="en-US" sz="1800" b="1" dirty="0">
+                <a:effectLst/>
+                <a:latin typeface="Times"/>
+                <a:ea typeface="Times New Roman" panose="02020603050405020304" pitchFamily="18" charset="0"/>
+                <a:cs typeface="Times New Roman" panose="02020603050405020304" pitchFamily="18" charset="0"/>
+              </a:rPr>
+              <a:t> </a:t>
+            </a:r>
+            <a:endParaRPr lang="en-US" sz="1800" dirty="0">
+              <a:effectLst/>
+              <a:latin typeface="Times New Roman" panose="02020603050405020304" pitchFamily="18" charset="0"/>
+              <a:ea typeface="Times New Roman" panose="02020603050405020304" pitchFamily="18" charset="0"/>
+            </a:endParaRPr>
+          </a:p>
+          <a:p>
+            <a:pPr marL="231775" marR="0" indent="0" algn="just">
+              <a:spcBef>
+                <a:spcPts val="0"/>
+              </a:spcBef>
+              <a:spcAft>
+                <a:spcPts val="0"/>
+              </a:spcAft>
+              <a:buNone/>
+            </a:pPr>
+            <a:r>
+              <a:rPr lang="en-US" sz="1800" dirty="0">
+                <a:effectLst/>
+                <a:latin typeface="Times"/>
+                <a:ea typeface="Times New Roman" panose="02020603050405020304" pitchFamily="18" charset="0"/>
+                <a:cs typeface="Times New Roman" panose="02020603050405020304" pitchFamily="18" charset="0"/>
+              </a:rPr>
+              <a:t>This technical data was produced for the U. S. Government under Contract Number 75FCMC18D0047, and is subject to Federal Acquisition Regulation Clause 52.227-14, Rights in Data-General.  </a:t>
+            </a:r>
+            <a:endParaRPr lang="en-US" sz="1800" dirty="0">
+              <a:effectLst/>
+              <a:latin typeface="Times New Roman" panose="02020603050405020304" pitchFamily="18" charset="0"/>
+              <a:ea typeface="Times New Roman" panose="02020603050405020304" pitchFamily="18" charset="0"/>
+            </a:endParaRPr>
+          </a:p>
+          <a:p>
+            <a:pPr marL="231775" marR="0" indent="0" algn="just">
+              <a:spcBef>
+                <a:spcPts val="0"/>
+              </a:spcBef>
+              <a:spcAft>
+                <a:spcPts val="0"/>
+              </a:spcAft>
+              <a:buNone/>
+            </a:pPr>
+            <a:r>
+              <a:rPr lang="en-US" sz="1800" dirty="0">
+                <a:effectLst/>
+                <a:latin typeface="Times"/>
+                <a:ea typeface="Times New Roman" panose="02020603050405020304" pitchFamily="18" charset="0"/>
+                <a:cs typeface="Times New Roman" panose="02020603050405020304" pitchFamily="18" charset="0"/>
+              </a:rPr>
+              <a:t> </a:t>
+            </a:r>
+            <a:endParaRPr lang="en-US" sz="1800" dirty="0">
+              <a:effectLst/>
+              <a:latin typeface="Times New Roman" panose="02020603050405020304" pitchFamily="18" charset="0"/>
+              <a:ea typeface="Times New Roman" panose="02020603050405020304" pitchFamily="18" charset="0"/>
+            </a:endParaRPr>
+          </a:p>
+          <a:p>
+            <a:pPr marL="231775" marR="0" indent="0" algn="just">
+              <a:spcBef>
+                <a:spcPts val="0"/>
+              </a:spcBef>
+              <a:spcAft>
+                <a:spcPts val="0"/>
+              </a:spcAft>
+              <a:buNone/>
+            </a:pPr>
+            <a:r>
+              <a:rPr lang="en-US" sz="1800" dirty="0">
+                <a:effectLst/>
+                <a:latin typeface="Times"/>
+                <a:ea typeface="Times New Roman" panose="02020603050405020304" pitchFamily="18" charset="0"/>
+                <a:cs typeface="Times New Roman" panose="02020603050405020304" pitchFamily="18" charset="0"/>
+              </a:rPr>
+              <a:t>No other use other than that granted to the U. S. Government, or to those acting on behalf of the U. S. Government under that Clause is authorized without the express written permission of The MITRE Corporation. </a:t>
+            </a:r>
+            <a:endParaRPr lang="en-US" sz="1800" dirty="0">
+              <a:effectLst/>
+              <a:latin typeface="Times New Roman" panose="02020603050405020304" pitchFamily="18" charset="0"/>
+              <a:ea typeface="Times New Roman" panose="02020603050405020304" pitchFamily="18" charset="0"/>
+            </a:endParaRPr>
+          </a:p>
+          <a:p>
+            <a:pPr marL="231775" marR="0" indent="0" algn="just">
+              <a:spcBef>
+                <a:spcPts val="0"/>
+              </a:spcBef>
+              <a:spcAft>
+                <a:spcPts val="0"/>
+              </a:spcAft>
+              <a:buNone/>
+            </a:pPr>
+            <a:r>
+              <a:rPr lang="en-US" sz="1800" dirty="0">
+                <a:effectLst/>
+                <a:latin typeface="Times"/>
+                <a:ea typeface="Times New Roman" panose="02020603050405020304" pitchFamily="18" charset="0"/>
+                <a:cs typeface="Times New Roman" panose="02020603050405020304" pitchFamily="18" charset="0"/>
+              </a:rPr>
+              <a:t> </a:t>
+            </a:r>
+            <a:endParaRPr lang="en-US" sz="1800" dirty="0">
+              <a:effectLst/>
+              <a:latin typeface="Times New Roman" panose="02020603050405020304" pitchFamily="18" charset="0"/>
+              <a:ea typeface="Times New Roman" panose="02020603050405020304" pitchFamily="18" charset="0"/>
+            </a:endParaRPr>
+          </a:p>
+          <a:p>
+            <a:pPr marL="231775" marR="0" indent="0" algn="just">
+              <a:spcBef>
+                <a:spcPts val="0"/>
+              </a:spcBef>
+              <a:spcAft>
+                <a:spcPts val="0"/>
+              </a:spcAft>
+              <a:buNone/>
+            </a:pPr>
+            <a:r>
+              <a:rPr lang="en-US" sz="1800" dirty="0">
+                <a:effectLst/>
+                <a:latin typeface="Times"/>
+                <a:ea typeface="Times New Roman" panose="02020603050405020304" pitchFamily="18" charset="0"/>
+                <a:cs typeface="Times New Roman" panose="02020603050405020304" pitchFamily="18" charset="0"/>
+              </a:rPr>
+              <a:t>For further information, please contact The MITRE Corporation, Contracts Management Office, 7515 </a:t>
+            </a:r>
+            <a:r>
+              <a:rPr lang="en-US" sz="1800" dirty="0" err="1">
+                <a:effectLst/>
+                <a:latin typeface="Times"/>
+                <a:ea typeface="Times New Roman" panose="02020603050405020304" pitchFamily="18" charset="0"/>
+                <a:cs typeface="Times New Roman" panose="02020603050405020304" pitchFamily="18" charset="0"/>
+              </a:rPr>
+              <a:t>Colshire</a:t>
+            </a:r>
+            <a:r>
+              <a:rPr lang="en-US" sz="1800" dirty="0">
+                <a:effectLst/>
+                <a:latin typeface="Times"/>
+                <a:ea typeface="Times New Roman" panose="02020603050405020304" pitchFamily="18" charset="0"/>
+                <a:cs typeface="Times New Roman" panose="02020603050405020304" pitchFamily="18" charset="0"/>
+              </a:rPr>
+              <a:t> Drive, McLean, VA  22102-7539, (703) 983-6000.  </a:t>
+            </a:r>
+            <a:endParaRPr lang="en-US" sz="1800" dirty="0">
+              <a:effectLst/>
+              <a:latin typeface="Times New Roman" panose="02020603050405020304" pitchFamily="18" charset="0"/>
+              <a:ea typeface="Times New Roman" panose="02020603050405020304" pitchFamily="18" charset="0"/>
+            </a:endParaRPr>
+          </a:p>
+          <a:p>
+            <a:pPr marL="231775" marR="0" indent="0">
+              <a:spcBef>
+                <a:spcPts val="0"/>
+              </a:spcBef>
+              <a:spcAft>
+                <a:spcPts val="0"/>
+              </a:spcAft>
+              <a:buNone/>
+            </a:pPr>
+            <a:r>
+              <a:rPr lang="en-US" sz="1800" dirty="0">
+                <a:effectLst/>
+                <a:latin typeface="Times"/>
+                <a:ea typeface="Times New Roman" panose="02020603050405020304" pitchFamily="18" charset="0"/>
+                <a:cs typeface="Times New Roman" panose="02020603050405020304" pitchFamily="18" charset="0"/>
+              </a:rPr>
+              <a:t> </a:t>
+            </a:r>
+            <a:endParaRPr lang="en-US" sz="1800" dirty="0">
+              <a:effectLst/>
+              <a:latin typeface="Times New Roman" panose="02020603050405020304" pitchFamily="18" charset="0"/>
+              <a:ea typeface="Times New Roman" panose="02020603050405020304" pitchFamily="18" charset="0"/>
+            </a:endParaRPr>
+          </a:p>
+          <a:p>
+            <a:pPr marL="231775" marR="0" indent="0" algn="ctr">
+              <a:spcBef>
+                <a:spcPts val="0"/>
+              </a:spcBef>
+              <a:spcAft>
+                <a:spcPts val="0"/>
+              </a:spcAft>
+              <a:buNone/>
+            </a:pPr>
+            <a:r>
+              <a:rPr lang="en-US" sz="1800" b="1" u="sng" dirty="0">
+                <a:effectLst/>
+                <a:latin typeface="Times"/>
+                <a:ea typeface="Times New Roman" panose="02020603050405020304" pitchFamily="18" charset="0"/>
+                <a:sym typeface="Symbol" pitchFamily="2" charset="2"/>
+              </a:rPr>
+              <a:t></a:t>
+            </a:r>
+            <a:r>
+              <a:rPr lang="en-US" sz="1800" b="1" u="sng" dirty="0">
+                <a:effectLst/>
+                <a:latin typeface="Times"/>
+                <a:ea typeface="Times New Roman" panose="02020603050405020304" pitchFamily="18" charset="0"/>
+                <a:cs typeface="Times New Roman" panose="02020603050405020304" pitchFamily="18" charset="0"/>
+              </a:rPr>
+              <a:t> 2023 The MITRE Corporation.</a:t>
+            </a:r>
+            <a:endParaRPr lang="en-US" sz="1800" dirty="0">
+              <a:effectLst/>
+              <a:latin typeface="Times New Roman" panose="02020603050405020304" pitchFamily="18" charset="0"/>
+              <a:ea typeface="Times New Roman" panose="02020603050405020304" pitchFamily="18" charset="0"/>
+            </a:endParaRPr>
+          </a:p>
+          <a:p>
+            <a:pPr marL="0" indent="0">
+              <a:buNone/>
+            </a:pPr>
+            <a:endParaRPr lang="en-US" dirty="0"/>
+          </a:p>
+        </p:txBody>
+      </p:sp>
+    </p:spTree>
+    <p:extLst>
+      <p:ext uri="{BB962C8B-B14F-4D97-AF65-F5344CB8AC3E}">
+        <p14:creationId xmlns:p14="http://schemas.microsoft.com/office/powerpoint/2010/main" val="65221876"/>
       </p:ext>
     </p:extLst>
   </p:cSld>
@@ -34975,21 +35406,6 @@
 </file>
 
 <file path=customXml/item1.xml><?xml version="1.0" encoding="utf-8"?>
-<p:properties xmlns:p="http://schemas.microsoft.com/office/2006/metadata/properties" xmlns:xsi="http://www.w3.org/2001/XMLSchema-instance" xmlns:pc="http://schemas.microsoft.com/office/infopath/2007/PartnerControls">
-  <documentManagement>
-    <Description xmlns="eebd8b74-b9de-41b2-9247-c010c4973c2b" xsi:nil="true"/>
-    <SharedWithUsers xmlns="b7009bbd-f938-489b-a530-f05273710fff">
-      <UserInfo>
-        <DisplayName>Inferno Members</DisplayName>
-        <AccountId>7</AccountId>
-        <AccountType/>
-      </UserInfo>
-    </SharedWithUsers>
-  </documentManagement>
-</p:properties>
-</file>
-
-<file path=customXml/item2.xml><?xml version="1.0" encoding="utf-8"?>
 <ct:contentTypeSchema xmlns:ct="http://schemas.microsoft.com/office/2006/metadata/contentType" xmlns:ma="http://schemas.microsoft.com/office/2006/metadata/properties/metaAttributes" ct:_="" ma:_="" ma:contentTypeName="Document" ma:contentTypeID="0x010100EC335ED7BB179244BF94A0DFE64544DC" ma:contentTypeVersion="11" ma:contentTypeDescription="Create a new document." ma:contentTypeScope="" ma:versionID="2c55b74878748077317e9774e705092b">
   <xsd:schema xmlns:xsd="http://www.w3.org/2001/XMLSchema" xmlns:xs="http://www.w3.org/2001/XMLSchema" xmlns:p="http://schemas.microsoft.com/office/2006/metadata/properties" xmlns:ns2="eebd8b74-b9de-41b2-9247-c010c4973c2b" xmlns:ns3="b7009bbd-f938-489b-a530-f05273710fff" targetNamespace="http://schemas.microsoft.com/office/2006/metadata/properties" ma:root="true" ma:fieldsID="e0930f41a11a950fb445bef7667fe7f3" ns2:_="" ns3:_="">
     <xsd:import namespace="eebd8b74-b9de-41b2-9247-c010c4973c2b"/>
@@ -35200,6 +35616,21 @@
 </ct:contentTypeSchema>
 </file>
 
+<file path=customXml/item2.xml><?xml version="1.0" encoding="utf-8"?>
+<p:properties xmlns:p="http://schemas.microsoft.com/office/2006/metadata/properties" xmlns:xsi="http://www.w3.org/2001/XMLSchema-instance" xmlns:pc="http://schemas.microsoft.com/office/infopath/2007/PartnerControls">
+  <documentManagement>
+    <Description xmlns="eebd8b74-b9de-41b2-9247-c010c4973c2b" xsi:nil="true"/>
+    <SharedWithUsers xmlns="b7009bbd-f938-489b-a530-f05273710fff">
+      <UserInfo>
+        <DisplayName>Inferno Members</DisplayName>
+        <AccountId>7</AccountId>
+        <AccountType/>
+      </UserInfo>
+    </SharedWithUsers>
+  </documentManagement>
+</p:properties>
+</file>
+
 <file path=customXml/item3.xml><?xml version="1.0" encoding="utf-8"?>
 <?mso-contentType ?>
 <FormTemplates xmlns="http://schemas.microsoft.com/sharepoint/v3/contenttype/forms">
@@ -35210,23 +35641,6 @@
 </file>
 
 <file path=customXml/itemProps1.xml><?xml version="1.0" encoding="utf-8"?>
-<ds:datastoreItem xmlns:ds="http://schemas.openxmlformats.org/officeDocument/2006/customXml" ds:itemID="{BDCEB03D-D58C-4A0F-A7F4-DC4EACB322EC}">
-  <ds:schemaRefs>
-    <ds:schemaRef ds:uri="b7009bbd-f938-489b-a530-f05273710fff"/>
-    <ds:schemaRef ds:uri="eebd8b74-b9de-41b2-9247-c010c4973c2b"/>
-    <ds:schemaRef ds:uri="http://purl.org/dc/dcmitype/"/>
-    <ds:schemaRef ds:uri="http://purl.org/dc/elements/1.1/"/>
-    <ds:schemaRef ds:uri="http://purl.org/dc/terms/"/>
-    <ds:schemaRef ds:uri="http://schemas.microsoft.com/office/2006/documentManagement/types"/>
-    <ds:schemaRef ds:uri="http://schemas.microsoft.com/office/2006/metadata/properties"/>
-    <ds:schemaRef ds:uri="http://schemas.microsoft.com/office/infopath/2007/PartnerControls"/>
-    <ds:schemaRef ds:uri="http://schemas.openxmlformats.org/package/2006/metadata/core-properties"/>
-    <ds:schemaRef ds:uri="http://www.w3.org/XML/1998/namespace"/>
-  </ds:schemaRefs>
-</ds:datastoreItem>
-</file>
-
-<file path=customXml/itemProps2.xml><?xml version="1.0" encoding="utf-8"?>
 <ds:datastoreItem xmlns:ds="http://schemas.openxmlformats.org/officeDocument/2006/customXml" ds:itemID="{7C349B60-A258-4A5D-8ED6-2330CCF5BD5F}">
   <ds:schemaRefs>
     <ds:schemaRef ds:uri="b7009bbd-f938-489b-a530-f05273710fff"/>
@@ -35245,6 +35659,23 @@
 </ds:datastoreItem>
 </file>
 
+<file path=customXml/itemProps2.xml><?xml version="1.0" encoding="utf-8"?>
+<ds:datastoreItem xmlns:ds="http://schemas.openxmlformats.org/officeDocument/2006/customXml" ds:itemID="{BDCEB03D-D58C-4A0F-A7F4-DC4EACB322EC}">
+  <ds:schemaRefs>
+    <ds:schemaRef ds:uri="b7009bbd-f938-489b-a530-f05273710fff"/>
+    <ds:schemaRef ds:uri="eebd8b74-b9de-41b2-9247-c010c4973c2b"/>
+    <ds:schemaRef ds:uri="http://purl.org/dc/dcmitype/"/>
+    <ds:schemaRef ds:uri="http://purl.org/dc/elements/1.1/"/>
+    <ds:schemaRef ds:uri="http://purl.org/dc/terms/"/>
+    <ds:schemaRef ds:uri="http://schemas.microsoft.com/office/2006/documentManagement/types"/>
+    <ds:schemaRef ds:uri="http://schemas.microsoft.com/office/2006/metadata/properties"/>
+    <ds:schemaRef ds:uri="http://schemas.microsoft.com/office/infopath/2007/PartnerControls"/>
+    <ds:schemaRef ds:uri="http://schemas.openxmlformats.org/package/2006/metadata/core-properties"/>
+    <ds:schemaRef ds:uri="http://www.w3.org/XML/1998/namespace"/>
+  </ds:schemaRefs>
+</ds:datastoreItem>
+</file>
+
 <file path=customXml/itemProps3.xml><?xml version="1.0" encoding="utf-8"?>
 <ds:datastoreItem xmlns:ds="http://schemas.openxmlformats.org/officeDocument/2006/customXml" ds:itemID="{F75499B4-9E7A-45F1-9440-1243E44787B5}">
   <ds:schemaRefs>

</xml_diff>